<commit_message>
Filling some of the level design fields
</commit_message>
<xml_diff>
--- a/Don't Burst My Bubble Presentation.pptx
+++ b/Don't Burst My Bubble Presentation.pptx
@@ -9089,14 +9089,14 @@
             <p:ph idx="1"/>
             <p:extLst>
               <p:ext uri="{D42A27DB-BD31-4B8C-83A1-F6EECF244321}">
-                <p14:modId xmlns:p14="http://schemas.microsoft.com/office/powerpoint/2010/main" val="2743193177"/>
+                <p14:modId xmlns:p14="http://schemas.microsoft.com/office/powerpoint/2010/main" val="2597945231"/>
               </p:ext>
             </p:extLst>
           </p:nvPr>
         </p:nvGraphicFramePr>
         <p:xfrm>
           <a:off x="6323013" y="446088"/>
-          <a:ext cx="5181600" cy="5296987"/>
+          <a:ext cx="5181600" cy="5824283"/>
         </p:xfrm>
         <a:graphic>
           <a:graphicData uri="http://schemas.openxmlformats.org/drawingml/2006/table">
@@ -9192,7 +9192,10 @@
                     <a:bodyPr/>
                     <a:lstStyle/>
                     <a:p>
-                      <a:endParaRPr lang="en-GB"/>
+                      <a:r>
+                        <a:rPr lang="en-GB" dirty="0"/>
+                        <a:t>The absolute basics</a:t>
+                      </a:r>
                     </a:p>
                   </a:txBody>
                   <a:tcPr/>
@@ -9202,7 +9205,10 @@
                     <a:bodyPr/>
                     <a:lstStyle/>
                     <a:p>
-                      <a:endParaRPr lang="en-GB"/>
+                      <a:r>
+                        <a:rPr lang="en-GB" dirty="0"/>
+                        <a:t>That enemies will chase the player</a:t>
+                      </a:r>
                     </a:p>
                   </a:txBody>
                   <a:tcPr/>
@@ -9232,7 +9238,10 @@
                     <a:bodyPr/>
                     <a:lstStyle/>
                     <a:p>
-                      <a:endParaRPr lang="en-GB"/>
+                      <a:r>
+                        <a:rPr lang="en-GB" dirty="0"/>
+                        <a:t>The enemies will can move back and forth</a:t>
+                      </a:r>
                     </a:p>
                   </a:txBody>
                   <a:tcPr/>
@@ -9242,7 +9251,10 @@
                     <a:bodyPr/>
                     <a:lstStyle/>
                     <a:p>
-                      <a:endParaRPr lang="en-GB"/>
+                      <a:r>
+                        <a:rPr lang="en-GB" dirty="0"/>
+                        <a:t>Timing your movement</a:t>
+                      </a:r>
                     </a:p>
                   </a:txBody>
                   <a:tcPr/>
@@ -9272,7 +9284,10 @@
                     <a:bodyPr/>
                     <a:lstStyle/>
                     <a:p>
-                      <a:endParaRPr lang="en-GB"/>
+                      <a:r>
+                        <a:rPr lang="en-GB" dirty="0"/>
+                        <a:t>Enemies will greatly increase speed</a:t>
+                      </a:r>
                     </a:p>
                   </a:txBody>
                   <a:tcPr/>
@@ -9282,7 +9297,10 @@
                     <a:bodyPr/>
                     <a:lstStyle/>
                     <a:p>
-                      <a:endParaRPr lang="en-GB"/>
+                      <a:r>
+                        <a:rPr lang="en-GB" dirty="0"/>
+                        <a:t>Need absolute perfect timing</a:t>
+                      </a:r>
                     </a:p>
                   </a:txBody>
                   <a:tcPr/>

</xml_diff>